<commit_message>
[Update] - Updated TypeScript 설치 방법.pptx has been upgraded
</commit_message>
<xml_diff>
--- a/TypeScript 설치 방법 추가.pptx
+++ b/TypeScript 설치 방법 추가.pptx
@@ -8,6 +8,7 @@
     <p:sldId id="256" r:id="rId2"/>
     <p:sldId id="257" r:id="rId3"/>
     <p:sldId id="258" r:id="rId4"/>
+    <p:sldId id="259" r:id="rId5"/>
   </p:sldIdLst>
   <p:sldSz cx="12192000" cy="6858000"/>
   <p:notesSz cx="6858000" cy="9144000"/>
@@ -3265,41 +3266,153 @@
           <a:chExt cx="0" cy="0"/>
         </a:xfrm>
       </p:grpSpPr>
-      <p:sp>
-        <p:nvSpPr>
-          <p:cNvPr id="2" name="제목 1"/>
-          <p:cNvSpPr>
-            <a:spLocks noGrp="1"/>
-          </p:cNvSpPr>
-          <p:nvPr>
-            <p:ph type="title"/>
-          </p:nvPr>
-        </p:nvSpPr>
-        <p:spPr/>
-        <p:txBody>
-          <a:bodyPr/>
-          <a:lstStyle/>
-          <a:p>
-            <a:endParaRPr lang="ko-KR" altLang="en-US"/>
-          </a:p>
-        </p:txBody>
-      </p:sp>
-      <p:sp>
-        <p:nvSpPr>
-          <p:cNvPr id="3" name="내용 개체 틀 2"/>
-          <p:cNvSpPr>
-            <a:spLocks noGrp="1"/>
-          </p:cNvSpPr>
-          <p:nvPr>
-            <p:ph idx="1"/>
-          </p:nvPr>
-        </p:nvSpPr>
-        <p:spPr/>
-        <p:txBody>
-          <a:bodyPr/>
-          <a:lstStyle/>
-          <a:p>
-            <a:endParaRPr lang="ko-KR" altLang="en-US"/>
+      <p:pic>
+        <p:nvPicPr>
+          <p:cNvPr id="4" name="그림 3"/>
+          <p:cNvPicPr>
+            <a:picLocks noChangeAspect="1"/>
+          </p:cNvPicPr>
+          <p:nvPr/>
+        </p:nvPicPr>
+        <p:blipFill>
+          <a:blip r:embed="rId2"/>
+          <a:stretch>
+            <a:fillRect/>
+          </a:stretch>
+        </p:blipFill>
+        <p:spPr>
+          <a:xfrm>
+            <a:off x="2092651" y="276937"/>
+            <a:ext cx="7391400" cy="4629150"/>
+          </a:xfrm>
+          <a:prstGeom prst="rect">
+            <a:avLst/>
+          </a:prstGeom>
+        </p:spPr>
+      </p:pic>
+      <p:sp>
+        <p:nvSpPr>
+          <p:cNvPr id="5" name="직사각형 4"/>
+          <p:cNvSpPr/>
+          <p:nvPr/>
+        </p:nvSpPr>
+        <p:spPr>
+          <a:xfrm>
+            <a:off x="1094541" y="4985237"/>
+            <a:ext cx="9515425" cy="784830"/>
+          </a:xfrm>
+          <a:prstGeom prst="rect">
+            <a:avLst/>
+          </a:prstGeom>
+          <a:noFill/>
+        </p:spPr>
+        <p:txBody>
+          <a:bodyPr wrap="none" lIns="91440" tIns="45720" rIns="91440" bIns="45720">
+            <a:spAutoFit/>
+          </a:bodyPr>
+          <a:lstStyle/>
+          <a:p>
+            <a:pPr algn="ctr"/>
+            <a:r>
+              <a:rPr lang="en-US" altLang="ko-KR" sz="4500" b="1" dirty="0" smtClean="0">
+                <a:ln w="22225">
+                  <a:solidFill>
+                    <a:schemeClr val="accent2"/>
+                  </a:solidFill>
+                  <a:prstDash val="solid"/>
+                </a:ln>
+                <a:solidFill>
+                  <a:schemeClr val="accent2">
+                    <a:lumMod val="40000"/>
+                    <a:lumOff val="60000"/>
+                  </a:schemeClr>
+                </a:solidFill>
+              </a:rPr>
+              <a:t>VS-Code </a:t>
+            </a:r>
+            <a:r>
+              <a:rPr lang="ko-KR" altLang="en-US" sz="4500" b="1" dirty="0" smtClean="0">
+                <a:ln w="22225">
+                  <a:solidFill>
+                    <a:schemeClr val="accent2"/>
+                  </a:solidFill>
+                  <a:prstDash val="solid"/>
+                </a:ln>
+                <a:solidFill>
+                  <a:schemeClr val="accent2">
+                    <a:lumMod val="40000"/>
+                    <a:lumOff val="60000"/>
+                  </a:schemeClr>
+                </a:solidFill>
+              </a:rPr>
+              <a:t>작업 폴더 내에서 </a:t>
+            </a:r>
+            <a:r>
+              <a:rPr lang="en-US" altLang="ko-KR" sz="4500" b="1" dirty="0" err="1" smtClean="0">
+                <a:ln w="22225">
+                  <a:solidFill>
+                    <a:schemeClr val="accent2"/>
+                  </a:solidFill>
+                  <a:prstDash val="solid"/>
+                </a:ln>
+                <a:solidFill>
+                  <a:schemeClr val="accent2">
+                    <a:lumMod val="40000"/>
+                    <a:lumOff val="60000"/>
+                  </a:schemeClr>
+                </a:solidFill>
+              </a:rPr>
+              <a:t>tsc</a:t>
+            </a:r>
+            <a:r>
+              <a:rPr lang="en-US" altLang="ko-KR" sz="4500" b="1" dirty="0" smtClean="0">
+                <a:ln w="22225">
+                  <a:solidFill>
+                    <a:schemeClr val="accent2"/>
+                  </a:solidFill>
+                  <a:prstDash val="solid"/>
+                </a:ln>
+                <a:solidFill>
+                  <a:schemeClr val="accent2">
+                    <a:lumMod val="40000"/>
+                    <a:lumOff val="60000"/>
+                  </a:schemeClr>
+                </a:solidFill>
+              </a:rPr>
+              <a:t> </a:t>
+            </a:r>
+            <a:r>
+              <a:rPr lang="ko-KR" altLang="en-US" sz="4500" b="1" dirty="0" smtClean="0">
+                <a:ln w="22225">
+                  <a:solidFill>
+                    <a:schemeClr val="accent2"/>
+                  </a:solidFill>
+                  <a:prstDash val="solid"/>
+                </a:ln>
+                <a:solidFill>
+                  <a:schemeClr val="accent2">
+                    <a:lumMod val="40000"/>
+                    <a:lumOff val="60000"/>
+                  </a:schemeClr>
+                </a:solidFill>
+              </a:rPr>
+              <a:t>입력</a:t>
+            </a:r>
+            <a:endParaRPr lang="en-US" altLang="ko-KR" sz="4500" b="1" cap="none" spc="0" dirty="0">
+              <a:ln w="22225">
+                <a:solidFill>
+                  <a:schemeClr val="accent2"/>
+                </a:solidFill>
+                <a:prstDash val="solid"/>
+              </a:ln>
+              <a:solidFill>
+                <a:schemeClr val="accent2">
+                  <a:lumMod val="40000"/>
+                  <a:lumOff val="60000"/>
+                </a:schemeClr>
+              </a:solidFill>
+              <a:effectLst/>
+            </a:endParaRPr>
           </a:p>
         </p:txBody>
       </p:sp>
@@ -3307,6 +3420,310 @@
     <p:extLst>
       <p:ext uri="{BB962C8B-B14F-4D97-AF65-F5344CB8AC3E}">
         <p14:creationId xmlns:p14="http://schemas.microsoft.com/office/powerpoint/2010/main" val="4153252362"/>
+      </p:ext>
+    </p:extLst>
+  </p:cSld>
+  <p:clrMapOvr>
+    <a:masterClrMapping/>
+  </p:clrMapOvr>
+</p:sld>
+</file>
+
+<file path=ppt/slides/slide4.xml><?xml version="1.0" encoding="utf-8"?>
+<p:sld xmlns:a="http://schemas.openxmlformats.org/drawingml/2006/main" xmlns:r="http://schemas.openxmlformats.org/officeDocument/2006/relationships" xmlns:p="http://schemas.openxmlformats.org/presentationml/2006/main">
+  <p:cSld>
+    <p:spTree>
+      <p:nvGrpSpPr>
+        <p:cNvPr id="1" name=""/>
+        <p:cNvGrpSpPr/>
+        <p:nvPr/>
+      </p:nvGrpSpPr>
+      <p:grpSpPr>
+        <a:xfrm>
+          <a:off x="0" y="0"/>
+          <a:ext cx="0" cy="0"/>
+          <a:chOff x="0" y="0"/>
+          <a:chExt cx="0" cy="0"/>
+        </a:xfrm>
+      </p:grpSpPr>
+      <p:pic>
+        <p:nvPicPr>
+          <p:cNvPr id="4" name="그림 3"/>
+          <p:cNvPicPr>
+            <a:picLocks noChangeAspect="1"/>
+          </p:cNvPicPr>
+          <p:nvPr/>
+        </p:nvPicPr>
+        <p:blipFill rotWithShape="1">
+          <a:blip r:embed="rId2"/>
+          <a:srcRect b="28753"/>
+          <a:stretch/>
+        </p:blipFill>
+        <p:spPr>
+          <a:xfrm>
+            <a:off x="1507398" y="1349166"/>
+            <a:ext cx="6542741" cy="359993"/>
+          </a:xfrm>
+          <a:prstGeom prst="rect">
+            <a:avLst/>
+          </a:prstGeom>
+        </p:spPr>
+      </p:pic>
+      <p:pic>
+        <p:nvPicPr>
+          <p:cNvPr id="5" name="그림 4"/>
+          <p:cNvPicPr>
+            <a:picLocks noChangeAspect="1"/>
+          </p:cNvPicPr>
+          <p:nvPr/>
+        </p:nvPicPr>
+        <p:blipFill>
+          <a:blip r:embed="rId3"/>
+          <a:stretch>
+            <a:fillRect/>
+          </a:stretch>
+        </p:blipFill>
+        <p:spPr>
+          <a:xfrm>
+            <a:off x="1532702" y="1917286"/>
+            <a:ext cx="3658268" cy="1437932"/>
+          </a:xfrm>
+          <a:prstGeom prst="rect">
+            <a:avLst/>
+          </a:prstGeom>
+        </p:spPr>
+      </p:pic>
+      <p:sp>
+        <p:nvSpPr>
+          <p:cNvPr id="6" name="직사각형 5"/>
+          <p:cNvSpPr/>
+          <p:nvPr/>
+        </p:nvSpPr>
+        <p:spPr>
+          <a:xfrm>
+            <a:off x="1892683" y="4985237"/>
+            <a:ext cx="7919156" cy="1477328"/>
+          </a:xfrm>
+          <a:prstGeom prst="rect">
+            <a:avLst/>
+          </a:prstGeom>
+          <a:noFill/>
+        </p:spPr>
+        <p:txBody>
+          <a:bodyPr wrap="none" lIns="91440" tIns="45720" rIns="91440" bIns="45720">
+            <a:spAutoFit/>
+          </a:bodyPr>
+          <a:lstStyle/>
+          <a:p>
+            <a:pPr algn="ctr"/>
+            <a:r>
+              <a:rPr lang="en-US" altLang="ko-KR" sz="4500" b="1" dirty="0" smtClean="0">
+                <a:ln w="22225">
+                  <a:solidFill>
+                    <a:schemeClr val="accent2"/>
+                  </a:solidFill>
+                  <a:prstDash val="solid"/>
+                </a:ln>
+                <a:solidFill>
+                  <a:schemeClr val="accent2">
+                    <a:lumMod val="40000"/>
+                    <a:lumOff val="60000"/>
+                  </a:schemeClr>
+                </a:solidFill>
+              </a:rPr>
+              <a:t>`</a:t>
+            </a:r>
+            <a:r>
+              <a:rPr lang="en-US" altLang="ko-KR" sz="4500" b="1" dirty="0" err="1" smtClean="0">
+                <a:ln w="22225">
+                  <a:solidFill>
+                    <a:schemeClr val="accent2"/>
+                  </a:solidFill>
+                  <a:prstDash val="solid"/>
+                </a:ln>
+                <a:solidFill>
+                  <a:schemeClr val="accent2">
+                    <a:lumMod val="40000"/>
+                    <a:lumOff val="60000"/>
+                  </a:schemeClr>
+                </a:solidFill>
+              </a:rPr>
+              <a:t>tsc</a:t>
+            </a:r>
+            <a:r>
+              <a:rPr lang="en-US" altLang="ko-KR" sz="4500" b="1" dirty="0" smtClean="0">
+                <a:ln w="22225">
+                  <a:solidFill>
+                    <a:schemeClr val="accent2"/>
+                  </a:solidFill>
+                  <a:prstDash val="solid"/>
+                </a:ln>
+                <a:solidFill>
+                  <a:schemeClr val="accent2">
+                    <a:lumMod val="40000"/>
+                    <a:lumOff val="60000"/>
+                  </a:schemeClr>
+                </a:solidFill>
+              </a:rPr>
+              <a:t>` </a:t>
+            </a:r>
+            <a:r>
+              <a:rPr lang="en-US" altLang="ko-KR" sz="4500" b="1" dirty="0" err="1" smtClean="0">
+                <a:ln w="22225">
+                  <a:solidFill>
+                    <a:schemeClr val="accent2"/>
+                  </a:solidFill>
+                  <a:prstDash val="solid"/>
+                </a:ln>
+                <a:solidFill>
+                  <a:schemeClr val="accent2">
+                    <a:lumMod val="40000"/>
+                    <a:lumOff val="60000"/>
+                  </a:schemeClr>
+                </a:solidFill>
+              </a:rPr>
+              <a:t>hello.ts</a:t>
+            </a:r>
+            <a:r>
+              <a:rPr lang="en-US" altLang="ko-KR" sz="4500" b="1" dirty="0" smtClean="0">
+                <a:ln w="22225">
+                  <a:solidFill>
+                    <a:schemeClr val="accent2"/>
+                  </a:solidFill>
+                  <a:prstDash val="solid"/>
+                </a:ln>
+                <a:solidFill>
+                  <a:schemeClr val="accent2">
+                    <a:lumMod val="40000"/>
+                    <a:lumOff val="60000"/>
+                  </a:schemeClr>
+                </a:solidFill>
+              </a:rPr>
+              <a:t> </a:t>
+            </a:r>
+            <a:r>
+              <a:rPr lang="ko-KR" altLang="en-US" sz="4500" b="1" dirty="0" smtClean="0">
+                <a:ln w="22225">
+                  <a:solidFill>
+                    <a:schemeClr val="accent2"/>
+                  </a:solidFill>
+                  <a:prstDash val="solid"/>
+                </a:ln>
+                <a:solidFill>
+                  <a:schemeClr val="accent2">
+                    <a:lumMod val="40000"/>
+                    <a:lumOff val="60000"/>
+                  </a:schemeClr>
+                </a:solidFill>
+              </a:rPr>
+              <a:t>로 파일 실행 후</a:t>
+            </a:r>
+            <a:r>
+              <a:rPr lang="en-US" altLang="ko-KR" sz="4500" b="1" dirty="0" smtClean="0">
+                <a:ln w="22225">
+                  <a:solidFill>
+                    <a:schemeClr val="accent2"/>
+                  </a:solidFill>
+                  <a:prstDash val="solid"/>
+                </a:ln>
+                <a:solidFill>
+                  <a:schemeClr val="accent2">
+                    <a:lumMod val="40000"/>
+                    <a:lumOff val="60000"/>
+                  </a:schemeClr>
+                </a:solidFill>
+              </a:rPr>
+              <a:t>,</a:t>
+            </a:r>
+            <a:br>
+              <a:rPr lang="en-US" altLang="ko-KR" sz="4500" b="1" dirty="0" smtClean="0">
+                <a:ln w="22225">
+                  <a:solidFill>
+                    <a:schemeClr val="accent2"/>
+                  </a:solidFill>
+                  <a:prstDash val="solid"/>
+                </a:ln>
+                <a:solidFill>
+                  <a:schemeClr val="accent2">
+                    <a:lumMod val="40000"/>
+                    <a:lumOff val="60000"/>
+                  </a:schemeClr>
+                </a:solidFill>
+              </a:rPr>
+            </a:br>
+            <a:r>
+              <a:rPr lang="en-US" altLang="ko-KR" sz="4500" b="1" dirty="0" err="1" smtClean="0">
+                <a:ln w="22225">
+                  <a:solidFill>
+                    <a:schemeClr val="accent2"/>
+                  </a:solidFill>
+                  <a:prstDash val="solid"/>
+                </a:ln>
+                <a:solidFill>
+                  <a:schemeClr val="accent2">
+                    <a:lumMod val="40000"/>
+                    <a:lumOff val="60000"/>
+                  </a:schemeClr>
+                </a:solidFill>
+              </a:rPr>
+              <a:t>js</a:t>
+            </a:r>
+            <a:r>
+              <a:rPr lang="en-US" altLang="ko-KR" sz="4500" b="1" dirty="0" smtClean="0">
+                <a:ln w="22225">
+                  <a:solidFill>
+                    <a:schemeClr val="accent2"/>
+                  </a:solidFill>
+                  <a:prstDash val="solid"/>
+                </a:ln>
+                <a:solidFill>
+                  <a:schemeClr val="accent2">
+                    <a:lumMod val="40000"/>
+                    <a:lumOff val="60000"/>
+                  </a:schemeClr>
+                </a:solidFill>
+              </a:rPr>
+              <a:t> </a:t>
+            </a:r>
+            <a:r>
+              <a:rPr lang="ko-KR" altLang="en-US" sz="4500" b="1" dirty="0" smtClean="0">
+                <a:ln w="22225">
+                  <a:solidFill>
+                    <a:schemeClr val="accent2"/>
+                  </a:solidFill>
+                  <a:prstDash val="solid"/>
+                </a:ln>
+                <a:solidFill>
+                  <a:schemeClr val="accent2">
+                    <a:lumMod val="40000"/>
+                    <a:lumOff val="60000"/>
+                  </a:schemeClr>
+                </a:solidFill>
+              </a:rPr>
+              <a:t>파일 생성 여부도 함께 확인</a:t>
+            </a:r>
+            <a:endParaRPr lang="en-US" altLang="ko-KR" sz="4500" b="1" cap="none" spc="0" dirty="0">
+              <a:ln w="22225">
+                <a:solidFill>
+                  <a:schemeClr val="accent2"/>
+                </a:solidFill>
+                <a:prstDash val="solid"/>
+              </a:ln>
+              <a:solidFill>
+                <a:schemeClr val="accent2">
+                  <a:lumMod val="40000"/>
+                  <a:lumOff val="60000"/>
+                </a:schemeClr>
+              </a:solidFill>
+              <a:effectLst/>
+            </a:endParaRPr>
+          </a:p>
+        </p:txBody>
+      </p:sp>
+    </p:spTree>
+    <p:extLst>
+      <p:ext uri="{BB962C8B-B14F-4D97-AF65-F5344CB8AC3E}">
+        <p14:creationId xmlns:p14="http://schemas.microsoft.com/office/powerpoint/2010/main" val="3383799333"/>
       </p:ext>
     </p:extLst>
   </p:cSld>

</xml_diff>